<commit_message>
Image Viewer UI 제작 완료
</commit_message>
<xml_diff>
--- a/LogViewer/LogViewer.pptx
+++ b/LogViewer/LogViewer.pptx
@@ -374,7 +374,7 @@
               <a:pPr>
                 <a:defRPr/>
               </a:pPr>
-              <a:t>2024-03-12</a:t>
+              <a:t>2024-03-13</a:t>
             </a:fld>
             <a:endParaRPr lang="ko-KR" altLang="en-US"/>
           </a:p>
@@ -621,7 +621,7 @@
               <a:pPr>
                 <a:defRPr/>
               </a:pPr>
-              <a:t>2024-03-12</a:t>
+              <a:t>2024-03-13</a:t>
             </a:fld>
             <a:endParaRPr lang="ko-KR" altLang="en-US"/>
           </a:p>
@@ -5393,7 +5393,7 @@
             </a:r>
             <a:r>
               <a:rPr lang="en-US" altLang="ko-KR" dirty="0"/>
-              <a:t>Viewer</a:t>
+              <a:t>Viewer UI</a:t>
             </a:r>
             <a:endParaRPr lang="ko-KR" altLang="en-US" dirty="0"/>
           </a:p>
@@ -11564,7 +11564,7 @@
           <a:p>
             <a:r>
               <a:rPr lang="en-US" altLang="ko-KR" dirty="0"/>
-              <a:t>Log Viewer – Model </a:t>
+              <a:t>Log Viewer Model </a:t>
             </a:r>
             <a:r>
               <a:rPr lang="en-US" altLang="ko-KR" dirty="0">
@@ -12485,107 +12485,6 @@
               <a:latin typeface="Arial" panose="020B0604020202020204" pitchFamily="34" charset="0"/>
               <a:cs typeface="Arial" panose="020B0604020202020204" pitchFamily="34" charset="0"/>
             </a:endParaRPr>
-          </a:p>
-        </p:txBody>
-      </p:sp>
-      <p:sp>
-        <p:nvSpPr>
-          <p:cNvPr id="23" name="사각형: 둥근 모서리 22">
-            <a:extLst>
-              <a:ext uri="{FF2B5EF4-FFF2-40B4-BE49-F238E27FC236}">
-                <a16:creationId xmlns:a16="http://schemas.microsoft.com/office/drawing/2014/main" id="{7A357F09-BE7C-4F0A-92BD-A5A2A71312AD}"/>
-              </a:ext>
-            </a:extLst>
-          </p:cNvPr>
-          <p:cNvSpPr/>
-          <p:nvPr/>
-        </p:nvSpPr>
-        <p:spPr>
-          <a:xfrm>
-            <a:off x="328811" y="4467669"/>
-            <a:ext cx="1656184" cy="315703"/>
-          </a:xfrm>
-          <a:prstGeom prst="roundRect">
-            <a:avLst/>
-          </a:prstGeom>
-          <a:solidFill>
-            <a:schemeClr val="accent4">
-              <a:lumMod val="20000"/>
-              <a:lumOff val="80000"/>
-            </a:schemeClr>
-          </a:solidFill>
-          <a:ln>
-            <a:noFill/>
-          </a:ln>
-        </p:spPr>
-        <p:style>
-          <a:lnRef idx="2">
-            <a:schemeClr val="accent1">
-              <a:shade val="50000"/>
-            </a:schemeClr>
-          </a:lnRef>
-          <a:fillRef idx="1">
-            <a:schemeClr val="accent1"/>
-          </a:fillRef>
-          <a:effectRef idx="0">
-            <a:schemeClr val="accent1"/>
-          </a:effectRef>
-          <a:fontRef idx="minor">
-            <a:schemeClr val="lt1"/>
-          </a:fontRef>
-        </p:style>
-        <p:txBody>
-          <a:bodyPr rtlCol="0" anchor="ctr"/>
-          <a:lstStyle/>
-          <a:p>
-            <a:pPr algn="ctr"/>
-            <a:endParaRPr lang="ko-KR" altLang="en-US"/>
-          </a:p>
-        </p:txBody>
-      </p:sp>
-      <p:sp>
-        <p:nvSpPr>
-          <p:cNvPr id="24" name="TextBox 23">
-            <a:extLst>
-              <a:ext uri="{FF2B5EF4-FFF2-40B4-BE49-F238E27FC236}">
-                <a16:creationId xmlns:a16="http://schemas.microsoft.com/office/drawing/2014/main" id="{59A72F19-FC86-469A-97DA-1FC1AE59186B}"/>
-              </a:ext>
-            </a:extLst>
-          </p:cNvPr>
-          <p:cNvSpPr txBox="1"/>
-          <p:nvPr/>
-        </p:nvSpPr>
-        <p:spPr>
-          <a:xfrm>
-            <a:off x="582430" y="4492913"/>
-            <a:ext cx="1212618" cy="246221"/>
-          </a:xfrm>
-          <a:prstGeom prst="rect">
-            <a:avLst/>
-          </a:prstGeom>
-          <a:noFill/>
-        </p:spPr>
-        <p:txBody>
-          <a:bodyPr wrap="square" rtlCol="0">
-            <a:spAutoFit/>
-          </a:bodyPr>
-          <a:lstStyle/>
-          <a:p>
-            <a:pPr algn="ctr"/>
-            <a:r>
-              <a:rPr lang="en-US" altLang="ko-KR" sz="1000" dirty="0" err="1">
-                <a:latin typeface="Arial" panose="020B0604020202020204" pitchFamily="34" charset="0"/>
-                <a:cs typeface="Arial" panose="020B0604020202020204" pitchFamily="34" charset="0"/>
-              </a:rPr>
-              <a:t>NetWork</a:t>
-            </a:r>
-            <a:r>
-              <a:rPr lang="en-US" altLang="ko-KR" sz="1000" dirty="0">
-                <a:latin typeface="Arial" panose="020B0604020202020204" pitchFamily="34" charset="0"/>
-                <a:cs typeface="Arial" panose="020B0604020202020204" pitchFamily="34" charset="0"/>
-              </a:rPr>
-              <a:t> Server</a:t>
-            </a:r>
           </a:p>
         </p:txBody>
       </p:sp>
@@ -13751,7 +13650,7 @@
           <a:p>
             <a:r>
               <a:rPr lang="en-US" altLang="ko-KR" dirty="0"/>
-              <a:t>Log Viewer - </a:t>
+              <a:t>Log Viewer </a:t>
             </a:r>
             <a:r>
               <a:rPr lang="en-US" altLang="ko-KR" dirty="0" err="1"/>
@@ -14082,20 +13981,12 @@
               <a:t> Class </a:t>
             </a:r>
             <a:r>
-              <a:rPr lang="ko-KR" altLang="en-US" sz="1000" dirty="0" err="1">
-                <a:solidFill>
-                  <a:schemeClr val="accent4"/>
-                </a:solidFill>
-              </a:rPr>
-              <a:t>생성한뒤</a:t>
-            </a:r>
-            <a:r>
               <a:rPr lang="ko-KR" altLang="en-US" sz="1000" dirty="0">
                 <a:solidFill>
                   <a:schemeClr val="accent4"/>
                 </a:solidFill>
               </a:rPr>
-              <a:t> </a:t>
+              <a:t>생성한 뒤 </a:t>
             </a:r>
             <a:r>
               <a:rPr lang="en-US" altLang="ko-KR" sz="1000" dirty="0">
@@ -14317,7 +14208,7 @@
           <a:p>
             <a:r>
               <a:rPr lang="en-US" altLang="ko-KR" dirty="0"/>
-              <a:t>Log Viewer – File Manager</a:t>
+              <a:t>Log Viewer File Manager</a:t>
             </a:r>
             <a:endParaRPr lang="ko-KR" altLang="en-US" dirty="0"/>
           </a:p>
@@ -14380,7 +14271,7 @@
         </p:blipFill>
         <p:spPr>
           <a:xfrm>
-            <a:off x="407368" y="2281933"/>
+            <a:off x="479376" y="2070380"/>
             <a:ext cx="3896268" cy="3591407"/>
           </a:xfrm>
           <a:prstGeom prst="rect">
@@ -14410,7 +14301,7 @@
         </p:blipFill>
         <p:spPr>
           <a:xfrm>
-            <a:off x="407368" y="1124744"/>
+            <a:off x="479376" y="913191"/>
             <a:ext cx="3896269" cy="714475"/>
           </a:xfrm>
           <a:prstGeom prst="rect">
@@ -14432,7 +14323,7 @@
         </p:nvSpPr>
         <p:spPr>
           <a:xfrm>
-            <a:off x="547523" y="1916832"/>
+            <a:off x="619531" y="1705279"/>
             <a:ext cx="3615957" cy="246221"/>
           </a:xfrm>
           <a:prstGeom prst="rect">
@@ -14448,16 +14339,12 @@
           <a:p>
             <a:pPr algn="ctr"/>
             <a:r>
-              <a:rPr lang="ko-KR" altLang="en-US" sz="1000" dirty="0"/>
-              <a:t>위 함수를 사용하여 </a:t>
-            </a:r>
-            <a:r>
               <a:rPr lang="en-US" altLang="ko-KR" sz="1000" dirty="0"/>
               <a:t>Queue</a:t>
             </a:r>
             <a:r>
               <a:rPr lang="ko-KR" altLang="en-US" sz="1000" dirty="0"/>
-              <a:t>에 파일에 적을 문자열 </a:t>
+              <a:t>에 파일에 저장할 문자 </a:t>
             </a:r>
             <a:r>
               <a:rPr lang="en-US" altLang="ko-KR" sz="1000" dirty="0"/>
@@ -14481,8 +14368,8 @@
         </p:nvSpPr>
         <p:spPr>
           <a:xfrm>
-            <a:off x="547522" y="5890194"/>
-            <a:ext cx="3615957" cy="246221"/>
+            <a:off x="619530" y="5678641"/>
+            <a:ext cx="3615957" cy="861774"/>
           </a:xfrm>
           <a:prstGeom prst="rect">
             <a:avLst/>
@@ -14495,30 +14382,103 @@
           </a:bodyPr>
           <a:lstStyle/>
           <a:p>
-            <a:pPr algn="ctr"/>
+            <a:pPr marL="228600" indent="-228600">
+              <a:buAutoNum type="arabicPeriod"/>
+            </a:pPr>
             <a:r>
               <a:rPr lang="en-US" altLang="ko-KR" sz="1000" dirty="0"/>
               <a:t>Queue</a:t>
             </a:r>
             <a:r>
               <a:rPr lang="ko-KR" altLang="en-US" sz="1000" dirty="0"/>
-              <a:t>에 원소가 생기면 </a:t>
+              <a:t>에서 원소를 </a:t>
             </a:r>
             <a:r>
               <a:rPr lang="en-US" altLang="ko-KR" sz="1000" dirty="0"/>
-              <a:t>Pop </a:t>
+              <a:t>pop </a:t>
             </a:r>
             <a:r>
               <a:rPr lang="ko-KR" altLang="en-US" sz="1000" dirty="0"/>
-              <a:t>하여 </a:t>
-            </a:r>
+              <a:t>한다</a:t>
+            </a:r>
+            <a:r>
+              <a:rPr lang="en-US" altLang="ko-KR" sz="1000" dirty="0"/>
+              <a:t>.</a:t>
+            </a:r>
+          </a:p>
+          <a:p>
+            <a:pPr marL="228600" indent="-228600">
+              <a:buAutoNum type="arabicPeriod"/>
+            </a:pPr>
+            <a:r>
+              <a:rPr lang="ko-KR" altLang="en-US" sz="1000" dirty="0"/>
+              <a:t>파일 이름을 만든다</a:t>
+            </a:r>
+            <a:r>
+              <a:rPr lang="en-US" altLang="ko-KR" sz="1000" dirty="0"/>
+              <a:t>. </a:t>
+            </a:r>
+            <a:r>
+              <a:rPr lang="ko-KR" altLang="en-US" sz="1000" dirty="0"/>
+              <a:t>이때 기존에</a:t>
+            </a:r>
+            <a:r>
+              <a:rPr lang="en-US" altLang="ko-KR" sz="1000" dirty="0"/>
+              <a:t> </a:t>
+            </a:r>
+            <a:r>
+              <a:rPr lang="ko-KR" altLang="en-US" sz="1000" dirty="0"/>
+              <a:t>생성한 파일 이름과 다르면 새로운 파일을 생성한다</a:t>
+            </a:r>
+            <a:r>
+              <a:rPr lang="en-US" altLang="ko-KR" sz="1000" dirty="0"/>
+              <a:t>.</a:t>
+            </a:r>
+          </a:p>
+          <a:p>
+            <a:pPr marL="228600" indent="-228600">
+              <a:buAutoNum type="arabicPeriod"/>
+            </a:pPr>
+            <a:r>
+              <a:rPr lang="ko-KR" altLang="en-US" sz="1000" dirty="0"/>
+              <a:t>생성한 파일에 로그를 적는다</a:t>
+            </a:r>
+            <a:r>
+              <a:rPr lang="en-US" altLang="ko-KR" sz="1000" dirty="0"/>
+              <a:t>.</a:t>
+            </a:r>
+          </a:p>
+          <a:p>
+            <a:pPr marL="228600" indent="-228600">
+              <a:buAutoNum type="arabicPeriod"/>
+            </a:pPr>
             <a:r>
               <a:rPr lang="en-US" altLang="ko-KR" sz="1000" dirty="0"/>
               <a:t>File</a:t>
             </a:r>
             <a:r>
               <a:rPr lang="ko-KR" altLang="en-US" sz="1000" dirty="0"/>
-              <a:t>에 저장</a:t>
+              <a:t> </a:t>
+            </a:r>
+            <a:r>
+              <a:rPr lang="en-US" altLang="ko-KR" sz="1000" dirty="0"/>
+              <a:t>Stream</a:t>
+            </a:r>
+            <a:r>
+              <a:rPr lang="ko-KR" altLang="en-US" sz="1000" dirty="0"/>
+              <a:t>을 비우고 </a:t>
+            </a:r>
+            <a:r>
+              <a:rPr lang="en-US" altLang="ko-KR" sz="1000" dirty="0"/>
+              <a:t>, </a:t>
+            </a:r>
+            <a:r>
+              <a:rPr lang="ko-KR" altLang="en-US" sz="1000" dirty="0"/>
+              <a:t>포인터를 가장 끝으로 옮긴다</a:t>
+            </a:r>
+            <a:r>
+              <a:rPr lang="en-US" altLang="ko-KR" sz="1000" dirty="0"/>
+              <a:t>.</a:t>
             </a:r>
           </a:p>
         </p:txBody>
@@ -14545,7 +14505,7 @@
         </p:blipFill>
         <p:spPr>
           <a:xfrm>
-            <a:off x="4439816" y="1124744"/>
+            <a:off x="4511824" y="913191"/>
             <a:ext cx="4464496" cy="4759891"/>
           </a:xfrm>
           <a:prstGeom prst="rect">
@@ -14567,8 +14527,8 @@
         </p:nvSpPr>
         <p:spPr>
           <a:xfrm>
-            <a:off x="4439816" y="5885796"/>
-            <a:ext cx="7381902" cy="861774"/>
+            <a:off x="4511824" y="5674243"/>
+            <a:ext cx="5400600" cy="861774"/>
           </a:xfrm>
           <a:prstGeom prst="rect">
             <a:avLst/>
@@ -14583,11 +14543,78 @@
           <a:p>
             <a:r>
               <a:rPr lang="en-US" altLang="ko-KR" sz="1000" dirty="0"/>
-              <a:t>Log File</a:t>
+              <a:t>Log</a:t>
             </a:r>
             <a:r>
               <a:rPr lang="ko-KR" altLang="en-US" sz="1000" dirty="0"/>
-              <a:t>은 시간단위로 생성한다</a:t>
+              <a:t> 파일은 시간 단위로 생성하며</a:t>
+            </a:r>
+            <a:r>
+              <a:rPr lang="en-US" altLang="ko-KR" sz="1000" dirty="0"/>
+              <a:t>, </a:t>
+            </a:r>
+            <a:r>
+              <a:rPr lang="ko-KR" altLang="en-US" sz="1000" dirty="0"/>
+              <a:t>쓰여지는 기준은 </a:t>
+            </a:r>
+            <a:r>
+              <a:rPr lang="en-US" altLang="ko-KR" sz="1000" dirty="0"/>
+              <a:t>Log</a:t>
+            </a:r>
+            <a:r>
+              <a:rPr lang="ko-KR" altLang="en-US" sz="1000" dirty="0"/>
+              <a:t>가 써진 시점이 되어야 하기 때문에 </a:t>
+            </a:r>
+            <a:endParaRPr lang="en-US" altLang="ko-KR" sz="1000" dirty="0"/>
+          </a:p>
+          <a:p>
+            <a:r>
+              <a:rPr lang="en-US" altLang="ko-KR" sz="1000" dirty="0"/>
+              <a:t>Log</a:t>
+            </a:r>
+            <a:r>
+              <a:rPr lang="ko-KR" altLang="en-US" sz="1000" dirty="0"/>
+              <a:t>의 맨 앞 </a:t>
+            </a:r>
+            <a:r>
+              <a:rPr lang="en-US" altLang="ko-KR" sz="1000" dirty="0"/>
+              <a:t>2</a:t>
+            </a:r>
+            <a:r>
+              <a:rPr lang="ko-KR" altLang="en-US" sz="1000" dirty="0"/>
+              <a:t>글자</a:t>
+            </a:r>
+            <a:r>
+              <a:rPr lang="en-US" altLang="ko-KR" sz="1000" dirty="0"/>
+              <a:t>(</a:t>
+            </a:r>
+            <a:r>
+              <a:rPr lang="ko-KR" altLang="en-US" sz="1000" dirty="0"/>
+              <a:t>시간</a:t>
+            </a:r>
+            <a:r>
+              <a:rPr lang="en-US" altLang="ko-KR" sz="1000" dirty="0"/>
+              <a:t>) </a:t>
+            </a:r>
+            <a:r>
+              <a:rPr lang="ko-KR" altLang="en-US" sz="1000" dirty="0"/>
+              <a:t>을 추출하여 파일 이름을 만들고</a:t>
+            </a:r>
+            <a:r>
+              <a:rPr lang="en-US" altLang="ko-KR" sz="1000" dirty="0"/>
+              <a:t>, </a:t>
+            </a:r>
+            <a:r>
+              <a:rPr lang="ko-KR" altLang="en-US" sz="1000" dirty="0"/>
+              <a:t>해당 파일에 </a:t>
+            </a:r>
+            <a:r>
+              <a:rPr lang="en-US" altLang="ko-KR" sz="1000" dirty="0"/>
+              <a:t>Log</a:t>
+            </a:r>
+            <a:r>
+              <a:rPr lang="ko-KR" altLang="en-US" sz="1000" dirty="0"/>
+              <a:t>를 저장한다</a:t>
             </a:r>
             <a:r>
               <a:rPr lang="en-US" altLang="ko-KR" sz="1000" dirty="0"/>
@@ -14595,9 +14622,47 @@
             </a:r>
           </a:p>
           <a:p>
+            <a:endParaRPr lang="en-US" altLang="ko-KR" sz="1000" dirty="0"/>
+          </a:p>
+          <a:p>
+            <a:r>
+              <a:rPr lang="en-US" altLang="ko-KR" sz="1000" dirty="0"/>
+              <a:t>Ex) Log </a:t>
+            </a:r>
             <a:r>
               <a:rPr lang="ko-KR" altLang="en-US" sz="1000" dirty="0"/>
-              <a:t>이때 </a:t>
+              <a:t>생성 시점 </a:t>
+            </a:r>
+            <a:r>
+              <a:rPr lang="en-US" altLang="ko-KR" sz="1000" dirty="0"/>
+              <a:t>: 11:59:58.686 </a:t>
+            </a:r>
+            <a:r>
+              <a:rPr lang="ko-KR" altLang="en-US" sz="1000" dirty="0"/>
+              <a:t>이고 파일에 </a:t>
+            </a:r>
+            <a:r>
+              <a:rPr lang="en-US" altLang="ko-KR" sz="1000" dirty="0"/>
+              <a:t>write </a:t>
+            </a:r>
+            <a:r>
+              <a:rPr lang="ko-KR" altLang="en-US" sz="1000" dirty="0"/>
+              <a:t>되는 시점이 </a:t>
+            </a:r>
+            <a:r>
+              <a:rPr lang="en-US" altLang="ko-KR" sz="1000" dirty="0"/>
+              <a:t>12:00:01:585 </a:t>
+            </a:r>
+            <a:r>
+              <a:rPr lang="ko-KR" altLang="en-US" sz="1000" dirty="0"/>
+              <a:t>이면</a:t>
+            </a:r>
+            <a:endParaRPr lang="en-US" altLang="ko-KR" sz="1000" dirty="0"/>
+          </a:p>
+          <a:p>
+            <a:r>
+              <a:rPr lang="ko-KR" altLang="en-US" sz="1000" dirty="0"/>
+              <a:t>해당 </a:t>
             </a:r>
             <a:r>
               <a:rPr lang="en-US" altLang="ko-KR" sz="1000" dirty="0"/>
@@ -14605,80 +14670,33 @@
             </a:r>
             <a:r>
               <a:rPr lang="ko-KR" altLang="en-US" sz="1000" dirty="0"/>
-              <a:t>가 쓰여진 시간 기준으로 파일에 적혀야 하기 때문에 </a:t>
+              <a:t>는 </a:t>
             </a:r>
             <a:r>
               <a:rPr lang="en-US" altLang="ko-KR" sz="1000" dirty="0"/>
-              <a:t>Log</a:t>
+              <a:t>11</a:t>
             </a:r>
             <a:r>
               <a:rPr lang="ko-KR" altLang="en-US" sz="1000" dirty="0"/>
-              <a:t>에서 앞에 </a:t>
+              <a:t>시 </a:t>
             </a:r>
             <a:r>
               <a:rPr lang="en-US" altLang="ko-KR" sz="1000" dirty="0"/>
-              <a:t>2</a:t>
+              <a:t>File</a:t>
             </a:r>
             <a:r>
               <a:rPr lang="ko-KR" altLang="en-US" sz="1000" dirty="0"/>
-              <a:t>글자 만 추출</a:t>
-            </a:r>
-            <a:r>
-              <a:rPr lang="en-US" altLang="ko-KR" sz="1000" dirty="0"/>
-              <a:t>(</a:t>
-            </a:r>
-            <a:r>
-              <a:rPr lang="ko-KR" altLang="en-US" sz="1000" dirty="0"/>
-              <a:t>시간</a:t>
-            </a:r>
-            <a:r>
-              <a:rPr lang="en-US" altLang="ko-KR" sz="1000" dirty="0"/>
-              <a:t>)</a:t>
-            </a:r>
-            <a:r>
-              <a:rPr lang="ko-KR" altLang="en-US" sz="1000" dirty="0"/>
-              <a:t>하여 파일을 만들고</a:t>
-            </a:r>
-            <a:endParaRPr lang="en-US" altLang="ko-KR" sz="1000" dirty="0"/>
-          </a:p>
-          <a:p>
-            <a:r>
-              <a:rPr lang="ko-KR" altLang="en-US" sz="1000" dirty="0"/>
-              <a:t> 해당 파일에 </a:t>
-            </a:r>
-            <a:r>
-              <a:rPr lang="en-US" altLang="ko-KR" sz="1000" dirty="0"/>
-              <a:t>Log</a:t>
-            </a:r>
-            <a:r>
-              <a:rPr lang="ko-KR" altLang="en-US" sz="1000" dirty="0"/>
-              <a:t>를 적는다</a:t>
-            </a:r>
-            <a:r>
-              <a:rPr lang="en-US" altLang="ko-KR" sz="1000" dirty="0"/>
-              <a:t>. </a:t>
-            </a:r>
-          </a:p>
-          <a:p>
-            <a:endParaRPr lang="en-US" altLang="ko-KR" sz="1000" dirty="0"/>
-          </a:p>
-          <a:p>
-            <a:r>
-              <a:rPr lang="ko-KR" altLang="en-US" sz="1000" dirty="0"/>
-              <a:t>이때 현재 </a:t>
-            </a:r>
-            <a:r>
-              <a:rPr lang="en-US" altLang="ko-KR" sz="1000" dirty="0"/>
-              <a:t>Log </a:t>
-            </a:r>
-            <a:r>
-              <a:rPr lang="ko-KR" altLang="en-US" sz="1000" dirty="0"/>
-              <a:t>파일 이름과 새로 추출하여 만든 로그 파일 이름이 다를 때 해당 파일을 닫고 새로운 파일을 만든다</a:t>
+              <a:t>에 저장이 된다</a:t>
             </a:r>
             <a:r>
               <a:rPr lang="en-US" altLang="ko-KR" sz="1000" dirty="0"/>
               <a:t>.</a:t>
             </a:r>
+            <a:r>
+              <a:rPr lang="ko-KR" altLang="en-US" sz="1000" dirty="0"/>
+              <a:t> </a:t>
+            </a:r>
+            <a:endParaRPr lang="en-US" altLang="ko-KR" sz="1000" dirty="0"/>
           </a:p>
         </p:txBody>
       </p:sp>
@@ -14743,7 +14761,7 @@
             </a:r>
             <a:r>
               <a:rPr lang="en-US" altLang="ko-KR" dirty="0"/>
-              <a:t>Viewer – Log File </a:t>
+              <a:t>Viewer Log File </a:t>
             </a:r>
             <a:r>
               <a:rPr lang="ko-KR" altLang="en-US" dirty="0"/>

</xml_diff>